<commit_message>
Updated AngularJS Components lab project
</commit_message>
<xml_diff>
--- a/06 - Angular/03 - DI, Intro to RxJS, Services/00 - Presentation/03. Angular-Fundamentals-Dependency-Injection-and-Services.pptx
+++ b/06 - Angular/03 - DI, Intro to RxJS, Services/00 - Presentation/03. Angular-Fundamentals-Dependency-Injection-and-Services.pptx
@@ -352,7 +352,7 @@
             <a:fld id="{4E087215-0C8F-4762-A664-737A353EC9A4}" type="datetimeFigureOut">
               <a:rPr lang="bg-BG" smtClean="0"/>
               <a:pPr/>
-              <a:t>14.6.2021 г.</a:t>
+              <a:t>13.9.2021 г.</a:t>
             </a:fld>
             <a:endParaRPr lang="bg-BG"/>
           </a:p>
@@ -545,7 +545,7 @@
             <a:fld id="{72D84649-876A-46C9-8472-14CB09C070D8}" type="datetimeFigureOut">
               <a:rPr lang="en-US" smtClean="0"/>
               <a:pPr/>
-              <a:t>6/14/2021</a:t>
+              <a:t>13-Sep-21</a:t>
             </a:fld>
             <a:endParaRPr lang="en-US"/>
           </a:p>
@@ -12679,7 +12679,7 @@
             </a:r>
             <a:r>
               <a:rPr lang="en-US" dirty="0"/>
-              <a:t>, should </a:t>
+              <a:t> should </a:t>
             </a:r>
             <a:r>
               <a:rPr lang="en-US" b="1" dirty="0">
@@ -13835,7 +13835,7 @@
           <a:p>
             <a:r>
               <a:rPr lang="en-US" dirty="0"/>
-              <a:t>Classes that </a:t>
+              <a:t>Classes that are </a:t>
             </a:r>
             <a:r>
               <a:rPr lang="en-US" b="1" dirty="0">
@@ -14631,7 +14631,7 @@
             </a:r>
             <a:r>
               <a:rPr lang="en-US" dirty="0"/>
-              <a:t> instantiate it's dependencies</a:t>
+              <a:t> instantiate its dependencies</a:t>
             </a:r>
           </a:p>
           <a:p>
@@ -17998,7 +17998,7 @@
           <a:p>
             <a:r>
               <a:rPr lang="en-US" dirty="0"/>
-              <a:t>Why We Need Services ?</a:t>
+              <a:t>Why Do We Need Services ?</a:t>
             </a:r>
             <a:endParaRPr lang="bg-BG" dirty="0"/>
           </a:p>

</xml_diff>